<commit_message>
Updated poster & plot
</commit_message>
<xml_diff>
--- a/Poster and Plots/Poster.pptx
+++ b/Poster and Plots/Poster.pptx
@@ -3120,8 +3120,8 @@
         </p:nvSpPr>
         <p:spPr bwMode="auto">
           <a:xfrm>
-            <a:off x="414178" y="6225385"/>
-            <a:ext cx="12137077" cy="10192534"/>
+            <a:off x="414178" y="5789139"/>
+            <a:ext cx="12137077" cy="9700091"/>
           </a:xfrm>
           <a:prstGeom prst="rect">
             <a:avLst/>
@@ -3257,7 +3257,7 @@
               </a:spcAft>
             </a:pPr>
             <a:r>
-              <a:rPr lang="en-US" sz="3600" b="1" dirty="0">
+              <a:rPr lang="en-US" sz="4800" b="1" dirty="0">
                 <a:solidFill>
                   <a:srgbClr val="005BBB"/>
                 </a:solidFill>
@@ -3273,7 +3273,7 @@
               </a:spcBef>
             </a:pPr>
             <a:r>
-              <a:rPr lang="en-US" altLang="en-US" sz="3800" dirty="0">
+              <a:rPr lang="en-US" altLang="en-US" sz="3600" dirty="0">
                 <a:latin typeface="+mn-lt"/>
                 <a:ea typeface="Arial" charset="0"/>
               </a:rPr>
@@ -3304,8 +3304,8 @@
         </p:blipFill>
         <p:spPr>
           <a:xfrm>
-            <a:off x="14106698" y="6029318"/>
-            <a:ext cx="15205365" cy="10228609"/>
+            <a:off x="508961" y="22591649"/>
+            <a:ext cx="12002692" cy="8074179"/>
           </a:xfrm>
           <a:prstGeom prst="rect">
             <a:avLst/>
@@ -3607,7 +3607,7 @@
         </p:nvSpPr>
         <p:spPr>
           <a:xfrm>
-            <a:off x="33805055" y="7842718"/>
+            <a:off x="30819710" y="6082157"/>
             <a:ext cx="9829800" cy="6601807"/>
           </a:xfrm>
           <a:prstGeom prst="rect">
@@ -3807,8 +3807,8 @@
         </p:blipFill>
         <p:spPr>
           <a:xfrm>
-            <a:off x="14274800" y="17206632"/>
-            <a:ext cx="15138400" cy="8331200"/>
+            <a:off x="15518290" y="22211912"/>
+            <a:ext cx="12028512" cy="6619718"/>
           </a:xfrm>
           <a:prstGeom prst="rect">
             <a:avLst/>
@@ -3823,8 +3823,8 @@
         </p:nvSpPr>
         <p:spPr>
           <a:xfrm>
-            <a:off x="414207" y="17346256"/>
-            <a:ext cx="12137048" cy="10177145"/>
+            <a:off x="13919824" y="5789139"/>
+            <a:ext cx="15316687" cy="9443611"/>
           </a:xfrm>
           <a:prstGeom prst="rect">
             <a:avLst/>
@@ -3858,30 +3858,22 @@
                 </a:solidFill>
                 <a:latin typeface="+mj-lt"/>
               </a:rPr>
-              <a:t>Methods</a:t>
-            </a:r>
-          </a:p>
-          <a:p>
-            <a:r>
-              <a:rPr lang="en-US" sz="3800" dirty="0"/>
-              <a:t>Our data is split into a training dataset containing approximately 96,000 comments, and a test dataset containing approximately 32,000 comments. We used a logistic regression classifier to predict a binary value for toxicity on the test dataset.</a:t>
-            </a:r>
-          </a:p>
-          <a:p>
-            <a:r>
-              <a:rPr lang="en-US" sz="3800" dirty="0"/>
-              <a:t>In order to ensure we have sufficient sample sizes for each identity term, we only show results for demographic identity terms that appear in at least 3% of comments with identity terms. Figure 1 shows the identity terms, in set T, that met our threshold. </a:t>
-            </a:r>
-          </a:p>
-          <a:p>
-            <a:br>
-              <a:rPr lang="en-US" sz="2800" dirty="0"/>
-            </a:br>
-            <a:br>
-              <a:rPr lang="en-US" sz="2800" dirty="0"/>
-            </a:br>
-            <a:r>
-              <a:rPr lang="en-US" sz="2800" b="1" dirty="0">
+              <a:t>Methods (continued)</a:t>
+            </a:r>
+            <a:endParaRPr lang="en-US" sz="2800" dirty="0"/>
+          </a:p>
+          <a:p>
+            <a:pPr>
+              <a:lnSpc>
+                <a:spcPts val="4600"/>
+              </a:lnSpc>
+              <a:spcAft>
+                <a:spcPts val="1200"/>
+              </a:spcAft>
+              <a:defRPr/>
+            </a:pPr>
+            <a:r>
+              <a:rPr lang="en-US" sz="4000" b="1" dirty="0">
                 <a:solidFill>
                   <a:schemeClr val="tx2"/>
                 </a:solidFill>
@@ -3894,14 +3886,64 @@
           </a:p>
           <a:p>
             <a:r>
-              <a:rPr lang="en-US" sz="2800">
+              <a:rPr lang="en-US" sz="3600" dirty="0">
                 <a:latin typeface="Arial" charset="0"/>
                 <a:ea typeface="Arial" charset="0"/>
                 <a:cs typeface="Arial" charset="0"/>
               </a:rPr>
               <a:t>T</a:t>
             </a:r>
-            <a:endParaRPr lang="en-US" sz="2800" dirty="0">
+            <a:r>
+              <a:rPr lang="en-US" sz="3600" dirty="0"/>
+              <a:t> o introduce noise into the training data, we randomly select some p% of comments, and for those comments, we assign a random toxicity value of either [0,1].  </a:t>
+            </a:r>
+          </a:p>
+          <a:p>
+            <a:r>
+              <a:rPr lang="en-US" sz="3600" dirty="0"/>
+              <a:t>Our metric for biased data is based on a generalized disparate impact for a large number of identities. Intuitively, a high disparate impact value means comments containing term </a:t>
+            </a:r>
+            <a:r>
+              <a:rPr lang="en-US" sz="3600" i="1" dirty="0"/>
+              <a:t>t</a:t>
+            </a:r>
+            <a:r>
+              <a:rPr lang="en-US" sz="3600" i="1" baseline="-25000" dirty="0"/>
+              <a:t>1</a:t>
+            </a:r>
+            <a:r>
+              <a:rPr lang="en-US" sz="3600" dirty="0"/>
+              <a:t> are more likely to be labeled as toxic than comments containing a term </a:t>
+            </a:r>
+            <a:r>
+              <a:rPr lang="en-US" sz="3600" i="1" dirty="0"/>
+              <a:t>t</a:t>
+            </a:r>
+            <a:r>
+              <a:rPr lang="en-US" sz="3600" i="1" baseline="-25000" dirty="0"/>
+              <a:t>2</a:t>
+            </a:r>
+            <a:r>
+              <a:rPr lang="en-US" sz="3600" dirty="0"/>
+              <a:t>. We compute disparate impact for all pairs of terms and compute our disparate impact as:</a:t>
+            </a:r>
+          </a:p>
+          <a:p>
+            <a:endParaRPr lang="en-US" sz="3600" dirty="0">
+              <a:latin typeface="Arial" charset="0"/>
+              <a:ea typeface="Arial" charset="0"/>
+              <a:cs typeface="Arial" charset="0"/>
+            </a:endParaRPr>
+          </a:p>
+          <a:p>
+            <a:endParaRPr lang="en-US" sz="3600" dirty="0">
+              <a:latin typeface="Arial" charset="0"/>
+              <a:ea typeface="Arial" charset="0"/>
+              <a:cs typeface="Arial" charset="0"/>
+            </a:endParaRPr>
+          </a:p>
+          <a:p>
+            <a:endParaRPr lang="en-US" sz="3600" dirty="0">
               <a:latin typeface="Arial" charset="0"/>
               <a:ea typeface="Arial" charset="0"/>
               <a:cs typeface="Arial" charset="0"/>
@@ -3930,7 +3972,7 @@
                 <a:ea typeface="Arial" charset="0"/>
                 <a:cs typeface="Arial" charset="0"/>
               </a:rPr>
-              <a:t>EUISMOD JUSTO VITAE PURUS</a:t>
+              <a:t>Variation in Cautiousness </a:t>
             </a:r>
             <a:endParaRPr lang="en-US" sz="2800" dirty="0">
               <a:latin typeface="Arial" charset="0"/>
@@ -4156,6 +4198,102 @@
                 <a:cs typeface="Arial" charset="0"/>
               </a:rPr>
               <a:t>in elementum orci dignissim. Proin semper ipsum</a:t>
+            </a:r>
+          </a:p>
+        </p:txBody>
+      </p:sp>
+      <p:pic>
+        <p:nvPicPr>
+          <p:cNvPr id="116" name="Picture 115">
+            <a:extLst>
+              <a:ext uri="{FF2B5EF4-FFF2-40B4-BE49-F238E27FC236}">
+                <a16:creationId xmlns:a16="http://schemas.microsoft.com/office/drawing/2014/main" id="{529F0F90-8088-854E-887C-5E5B59BEFB88}"/>
+              </a:ext>
+            </a:extLst>
+          </p:cNvPr>
+          <p:cNvPicPr>
+            <a:picLocks noChangeAspect="1"/>
+          </p:cNvPicPr>
+          <p:nvPr/>
+        </p:nvPicPr>
+        <p:blipFill>
+          <a:blip r:embed="rId6"/>
+          <a:stretch>
+            <a:fillRect/>
+          </a:stretch>
+        </p:blipFill>
+        <p:spPr>
+          <a:xfrm>
+            <a:off x="14100489" y="11815328"/>
+            <a:ext cx="14864357" cy="1737272"/>
+          </a:xfrm>
+          <a:prstGeom prst="rect">
+            <a:avLst/>
+          </a:prstGeom>
+        </p:spPr>
+      </p:pic>
+      <p:sp>
+        <p:nvSpPr>
+          <p:cNvPr id="117" name="TextBox 116">
+            <a:extLst>
+              <a:ext uri="{FF2B5EF4-FFF2-40B4-BE49-F238E27FC236}">
+                <a16:creationId xmlns:a16="http://schemas.microsoft.com/office/drawing/2014/main" id="{0585D86E-6C34-9A46-9570-A855965C525B}"/>
+              </a:ext>
+            </a:extLst>
+          </p:cNvPr>
+          <p:cNvSpPr txBox="1"/>
+          <p:nvPr/>
+        </p:nvSpPr>
+        <p:spPr>
+          <a:xfrm>
+            <a:off x="342954" y="15802231"/>
+            <a:ext cx="12809174" cy="6376104"/>
+          </a:xfrm>
+          <a:prstGeom prst="rect">
+            <a:avLst/>
+          </a:prstGeom>
+          <a:solidFill>
+            <a:schemeClr val="bg1">
+              <a:alpha val="63000"/>
+            </a:schemeClr>
+          </a:solidFill>
+          <a:effectLst/>
+        </p:spPr>
+        <p:txBody>
+          <a:bodyPr wrap="square">
+            <a:spAutoFit/>
+          </a:bodyPr>
+          <a:lstStyle/>
+          <a:p>
+            <a:pPr>
+              <a:lnSpc>
+                <a:spcPts val="4600"/>
+              </a:lnSpc>
+              <a:spcAft>
+                <a:spcPts val="1200"/>
+              </a:spcAft>
+              <a:defRPr/>
+            </a:pPr>
+            <a:r>
+              <a:rPr lang="en-US" sz="4800" b="1" dirty="0">
+                <a:solidFill>
+                  <a:srgbClr val="005BBB"/>
+                </a:solidFill>
+                <a:latin typeface="+mj-lt"/>
+              </a:rPr>
+              <a:t>Methods</a:t>
+            </a:r>
+          </a:p>
+          <a:p>
+            <a:r>
+              <a:rPr lang="en-US" sz="3600" dirty="0"/>
+              <a:t>Our data is split into a training dataset containing approximately 96,000 comments, and a test dataset containing approximately 32,000 comments. We used a logistic regression classifier to predict a binary value for toxicity on the test dataset.</a:t>
+            </a:r>
+          </a:p>
+          <a:p>
+            <a:r>
+              <a:rPr lang="en-US" sz="3600" dirty="0"/>
+              <a:t>In order to ensure we have sufficient sample sizes for each identity term, we only show results for demographic identity terms that appear in at least 3% of comments with identity terms. Figure 1 shows the identity terms, in set T, that met our threshold. </a:t>
             </a:r>
           </a:p>
         </p:txBody>

</xml_diff>